<commit_message>
präsentation update kp ob richtig gedacht
</commit_message>
<xml_diff>
--- a/Projektmanagement/Abschlusspräsentation.pptx
+++ b/Projektmanagement/Abschlusspräsentation.pptx
@@ -158,7 +158,7 @@
   </p:defaultTextStyle>
   <p:extLst>
     <p:ext uri="{EFAFB233-063F-42B5-8137-9DF3F51BA10A}">
-      <p15:sldGuideLst xmlns:p15="http://schemas.microsoft.com/office/powerpoint/2012/main" xmlns="">
+      <p15:sldGuideLst xmlns:p15="http://schemas.microsoft.com/office/powerpoint/2012/main">
         <p15:guide id="1" orient="horz" pos="2160">
           <p15:clr>
             <a:srgbClr val="A4A3A4"/>
@@ -172,13 +172,23 @@
       </p15:sldGuideLst>
     </p:ext>
     <p:ext uri="{2D200454-40CA-4A62-9FC3-DE9A4176ACB9}">
-      <p15:notesGuideLst xmlns:p15="http://schemas.microsoft.com/office/powerpoint/2012/main" xmlns="">
+      <p15:notesGuideLst xmlns:p15="http://schemas.microsoft.com/office/powerpoint/2012/main">
         <p15:guide id="1" orient="horz" pos="2880">
           <p15:clr>
             <a:srgbClr val="A4A3A4"/>
           </p15:clr>
         </p15:guide>
         <p15:guide id="2" pos="2160">
+          <p15:clr>
+            <a:srgbClr val="A4A3A4"/>
+          </p15:clr>
+        </p15:guide>
+        <p15:guide id="3" orient="horz" pos="3156">
+          <p15:clr>
+            <a:srgbClr val="A4A3A4"/>
+          </p15:clr>
+        </p15:guide>
+        <p15:guide id="4" pos="2170">
           <p15:clr>
             <a:srgbClr val="A4A3A4"/>
           </p15:clr>
@@ -1931,51 +1941,51 @@
     </dgm:pt>
   </dgm:ptLst>
   <dgm:cxnLst>
+    <dgm:cxn modelId="{C75F7C68-8484-4A91-B6A3-583D73E6BC93}" type="presOf" srcId="{124AB731-44F7-42FC-A2C7-6A103755875A}" destId="{BA4718A9-DFD2-471C-969C-97F876ADC320}" srcOrd="0" destOrd="4" presId="urn:microsoft.com/office/officeart/2005/8/layout/hProcess9"/>
+    <dgm:cxn modelId="{742F0ED1-DC5E-4FDC-BC68-EC649BA19C45}" srcId="{B4BBFA07-05DD-4CDD-AC39-6342607DC2A1}" destId="{10E407B9-5FCC-4D3A-94D2-6AB25397AEC7}" srcOrd="0" destOrd="0" parTransId="{0560221A-0D57-438B-900A-B03E24CCA932}" sibTransId="{40E49337-7DC0-4E0E-B2C1-5C40A2AD0A26}"/>
+    <dgm:cxn modelId="{63AA4ECF-F510-4F05-A169-468A7E8A96E5}" type="presOf" srcId="{6043B0A8-44FC-4706-B37A-7F342ABD7CAE}" destId="{F3C847B4-E9D1-403C-BF56-3BADCB1909DC}" srcOrd="0" destOrd="0" presId="urn:microsoft.com/office/officeart/2005/8/layout/hProcess9"/>
+    <dgm:cxn modelId="{24BACCAC-AE3B-4A99-B678-9387F463D2EF}" srcId="{6043B0A8-44FC-4706-B37A-7F342ABD7CAE}" destId="{60FFB2DA-71E2-4B60-8F03-B97F02814FE8}" srcOrd="1" destOrd="0" parTransId="{F5495816-0C9E-4B5B-A238-F565E58D7803}" sibTransId="{D06C6867-E1BA-43A9-A6CE-AE88C2CD94FD}"/>
+    <dgm:cxn modelId="{3F65C4C7-8DE4-4F28-82C5-0662EBCF8C0E}" srcId="{DBD17336-B141-494E-A31C-6EA653EE637A}" destId="{FCE05639-9A34-421D-9FD3-79EEF57498D8}" srcOrd="0" destOrd="0" parTransId="{F3903BDF-F0ED-4A06-8C1B-A96D8DDD8DDC}" sibTransId="{4F6AA9F8-0B5F-499B-AE30-3D935C570E4E}"/>
+    <dgm:cxn modelId="{9E16A8B2-B87E-4EC6-8F80-A092713ABD93}" type="presOf" srcId="{64A53441-CA35-4183-98A4-98146221F8AE}" destId="{F3C847B4-E9D1-403C-BF56-3BADCB1909DC}" srcOrd="0" destOrd="3" presId="urn:microsoft.com/office/officeart/2005/8/layout/hProcess9"/>
+    <dgm:cxn modelId="{E98B806D-7427-40E5-9217-58A7BBA4F702}" type="presOf" srcId="{BFAD5C6C-3CCC-47DA-B82A-97A0E60E41A5}" destId="{8C0195AE-96DF-44DB-8CA5-EA3E73389D9C}" srcOrd="0" destOrd="2" presId="urn:microsoft.com/office/officeart/2005/8/layout/hProcess9"/>
+    <dgm:cxn modelId="{D4AF4160-DDE6-4565-8479-2BC7137E4EDA}" type="presOf" srcId="{8693C395-BAA7-449A-ACDD-FFFEEE0DC862}" destId="{20382240-D5AC-4B89-8E53-73A8B41769F1}" srcOrd="0" destOrd="2" presId="urn:microsoft.com/office/officeart/2005/8/layout/hProcess9"/>
+    <dgm:cxn modelId="{1CE0B2E1-B57A-47FF-B7CD-0A610852C41C}" type="presOf" srcId="{60FFB2DA-71E2-4B60-8F03-B97F02814FE8}" destId="{F3C847B4-E9D1-403C-BF56-3BADCB1909DC}" srcOrd="0" destOrd="2" presId="urn:microsoft.com/office/officeart/2005/8/layout/hProcess9"/>
     <dgm:cxn modelId="{60C1C020-F1A3-4D32-B6BC-9893F6A3628C}" type="presOf" srcId="{360394FA-829F-403E-9AF0-5F6CF96DFD1E}" destId="{8C0195AE-96DF-44DB-8CA5-EA3E73389D9C}" srcOrd="0" destOrd="4" presId="urn:microsoft.com/office/officeart/2005/8/layout/hProcess9"/>
+    <dgm:cxn modelId="{08E746BB-D95F-4886-82E3-5ED9A83CD38E}" type="presOf" srcId="{FCE05639-9A34-421D-9FD3-79EEF57498D8}" destId="{62F66354-603A-41C3-B161-16A4A9E45F44}" srcOrd="0" destOrd="1" presId="urn:microsoft.com/office/officeart/2005/8/layout/hProcess9"/>
+    <dgm:cxn modelId="{DB1CAB31-0E81-4807-9A4F-8B2AC71839A2}" type="presOf" srcId="{1D2BD1DA-3657-4A8C-9785-D7282AB16A84}" destId="{F3C847B4-E9D1-403C-BF56-3BADCB1909DC}" srcOrd="0" destOrd="4" presId="urn:microsoft.com/office/officeart/2005/8/layout/hProcess9"/>
+    <dgm:cxn modelId="{B317833C-6656-437C-8CFB-9E1078BA4F7B}" srcId="{B4BBFA07-05DD-4CDD-AC39-6342607DC2A1}" destId="{BFAD5C6C-3CCC-47DA-B82A-97A0E60E41A5}" srcOrd="1" destOrd="0" parTransId="{2AC788DB-883E-4B3F-8E32-FB8F2C3C80B9}" sibTransId="{0A4F5D0E-4864-4480-8E69-940E5490226B}"/>
     <dgm:cxn modelId="{F1608424-95E6-4187-9F50-C1AB10DFF465}" srcId="{42A7AF39-9F16-4BE0-9691-F2A4EAA889D5}" destId="{6043B0A8-44FC-4706-B37A-7F342ABD7CAE}" srcOrd="2" destOrd="0" parTransId="{D8109DA1-2E16-4DF6-A989-9DA006F96235}" sibTransId="{3B27F8F0-46DD-48CE-89ED-BD65A552898B}"/>
+    <dgm:cxn modelId="{B848308C-6711-4ECC-A275-3BD95A47C3D1}" type="presOf" srcId="{3F8391EC-2E89-41BC-979F-48D4E21A811C}" destId="{BA4718A9-DFD2-471C-969C-97F876ADC320}" srcOrd="0" destOrd="3" presId="urn:microsoft.com/office/officeart/2005/8/layout/hProcess9"/>
+    <dgm:cxn modelId="{8130EFA1-7C19-4707-918B-EBD61B992DC1}" srcId="{182E85C3-C0C1-4055-B42E-08657C1D36EB}" destId="{2739C324-A41E-4970-8A01-796A2C795ACC}" srcOrd="0" destOrd="0" parTransId="{34EABE2C-343C-4A99-94EF-992C7B2864FB}" sibTransId="{E3CAAA70-690B-43D6-AD4A-610350C2031C}"/>
+    <dgm:cxn modelId="{5647984F-2F20-4C53-AFA6-A50F0B2D982A}" srcId="{42A7AF39-9F16-4BE0-9691-F2A4EAA889D5}" destId="{5245D8E1-9FDE-4633-85B7-BE42CD6AA787}" srcOrd="4" destOrd="0" parTransId="{55F15053-25F4-4161-BCA1-92DDB4FB32E9}" sibTransId="{B0D58DB8-A061-4E28-A244-8F898564CBF4}"/>
+    <dgm:cxn modelId="{3A080199-5708-4D95-BDC6-677CE1E53018}" srcId="{B4BBFA07-05DD-4CDD-AC39-6342607DC2A1}" destId="{360394FA-829F-403E-9AF0-5F6CF96DFD1E}" srcOrd="3" destOrd="0" parTransId="{A75ACD84-8BFD-4E17-B22A-BCE08E0C1060}" sibTransId="{47CD002A-17EB-41C8-A521-C511E59926EB}"/>
+    <dgm:cxn modelId="{165AFAEA-5E3C-4D2F-B24C-8AB5DB51E1D8}" srcId="{DBD17336-B141-494E-A31C-6EA653EE637A}" destId="{8852547F-3DE1-4303-BABC-35751A1FFAA4}" srcOrd="1" destOrd="0" parTransId="{E3280EF4-38C9-4B21-B7E2-305ED52D9188}" sibTransId="{7EF36CEC-CFA4-4D2A-9ADF-9A92FE46FB8F}"/>
+    <dgm:cxn modelId="{9423DADA-472C-41D9-88AD-46BB03D27D4E}" srcId="{6043B0A8-44FC-4706-B37A-7F342ABD7CAE}" destId="{ABD30D39-23EC-4FCC-9B13-57D32A82A546}" srcOrd="0" destOrd="0" parTransId="{C5A94903-DF8D-4907-A3E8-951CE956DA5D}" sibTransId="{3EF7BC8F-673B-4ADA-9436-138C06DF52D8}"/>
+    <dgm:cxn modelId="{DECDAAFB-95F9-4E08-902E-357CAE6BE867}" srcId="{42A7AF39-9F16-4BE0-9691-F2A4EAA889D5}" destId="{182E85C3-C0C1-4055-B42E-08657C1D36EB}" srcOrd="1" destOrd="0" parTransId="{0A1F7A6C-A332-4BAC-A0D1-C846CF97F4EC}" sibTransId="{53EC14C8-D3F0-4F81-A9BC-0E03B0043A69}"/>
+    <dgm:cxn modelId="{2198E06B-EBEE-42F2-BF31-52AD13E73BC6}" srcId="{42A7AF39-9F16-4BE0-9691-F2A4EAA889D5}" destId="{DBD17336-B141-494E-A31C-6EA653EE637A}" srcOrd="3" destOrd="0" parTransId="{09A6F55D-0974-44D2-B12D-48E16F3D0029}" sibTransId="{A6141C16-1C65-42F9-8DF0-A27738FE79EE}"/>
+    <dgm:cxn modelId="{58ECD606-DF49-456C-92CC-3FC995338DA5}" srcId="{182E85C3-C0C1-4055-B42E-08657C1D36EB}" destId="{1E975C45-1647-472C-8812-EFF81A215801}" srcOrd="4" destOrd="0" parTransId="{11DCAC3E-4C2C-4945-B245-E7C69099CB34}" sibTransId="{50A0534A-8921-429F-AEBF-0E0D60438255}"/>
+    <dgm:cxn modelId="{EFB2B553-798E-499E-868E-5A323D49D87B}" type="presOf" srcId="{8852547F-3DE1-4303-BABC-35751A1FFAA4}" destId="{62F66354-603A-41C3-B161-16A4A9E45F44}" srcOrd="0" destOrd="2" presId="urn:microsoft.com/office/officeart/2005/8/layout/hProcess9"/>
+    <dgm:cxn modelId="{20EFF80B-8D1F-44F0-A98A-47DA2A47CC91}" type="presOf" srcId="{B4BBFA07-05DD-4CDD-AC39-6342607DC2A1}" destId="{8C0195AE-96DF-44DB-8CA5-EA3E73389D9C}" srcOrd="0" destOrd="0" presId="urn:microsoft.com/office/officeart/2005/8/layout/hProcess9"/>
+    <dgm:cxn modelId="{4AA9AB66-BA44-475B-A8A8-30AD54C4CD1A}" srcId="{6043B0A8-44FC-4706-B37A-7F342ABD7CAE}" destId="{1D2BD1DA-3657-4A8C-9785-D7282AB16A84}" srcOrd="3" destOrd="0" parTransId="{13AD18B7-6C9D-4DA5-8CF7-426D68467982}" sibTransId="{5FB73046-B1E2-46DC-A2CC-49B3DBF79A17}"/>
+    <dgm:cxn modelId="{238D6892-0E24-4060-A415-A69BB6AA037E}" type="presOf" srcId="{27323C3F-7D4E-44F5-9FA3-413CFCD7B174}" destId="{8C0195AE-96DF-44DB-8CA5-EA3E73389D9C}" srcOrd="0" destOrd="3" presId="urn:microsoft.com/office/officeart/2005/8/layout/hProcess9"/>
+    <dgm:cxn modelId="{E2E8D555-E2A1-4B5C-B90D-F16299503649}" srcId="{182E85C3-C0C1-4055-B42E-08657C1D36EB}" destId="{DDBD9E0E-2857-478B-9BFD-EB049F36A6F4}" srcOrd="1" destOrd="0" parTransId="{64FDB413-C3BC-4DF0-942B-0162F878BA5B}" sibTransId="{79BD68F6-F4B8-49E3-96CA-A2D68A915F02}"/>
+    <dgm:cxn modelId="{21C40A1C-D218-4855-8389-19E2BFED7B78}" type="presOf" srcId="{ABD30D39-23EC-4FCC-9B13-57D32A82A546}" destId="{F3C847B4-E9D1-403C-BF56-3BADCB1909DC}" srcOrd="0" destOrd="1" presId="urn:microsoft.com/office/officeart/2005/8/layout/hProcess9"/>
+    <dgm:cxn modelId="{549CF814-C607-4921-A024-5CFAC5637540}" srcId="{5245D8E1-9FDE-4633-85B7-BE42CD6AA787}" destId="{AD34B4C5-1A81-4AC6-A5F9-35CC4DC5D843}" srcOrd="0" destOrd="0" parTransId="{FD6F77B6-DA9F-491F-B649-F16E90DA55B0}" sibTransId="{8B95582E-B691-45DD-8D9C-114E0B7A4E01}"/>
+    <dgm:cxn modelId="{5DFF5E92-6524-4E83-9A7E-3FD2AE1E0B19}" srcId="{42A7AF39-9F16-4BE0-9691-F2A4EAA889D5}" destId="{B4BBFA07-05DD-4CDD-AC39-6342607DC2A1}" srcOrd="0" destOrd="0" parTransId="{4C9357AE-0A8A-4E31-8803-F14E79C0DCAE}" sibTransId="{B652451A-AD6D-4DFA-B925-9D21BB71A0C7}"/>
+    <dgm:cxn modelId="{F99FE896-AED4-426E-B77C-0AB5248E0CCE}" srcId="{6043B0A8-44FC-4706-B37A-7F342ABD7CAE}" destId="{64A53441-CA35-4183-98A4-98146221F8AE}" srcOrd="2" destOrd="0" parTransId="{34A59247-41BB-4387-901C-F4B4BA0ABC20}" sibTransId="{0C284384-0EF7-4A62-BF30-04B34F7CD0AC}"/>
+    <dgm:cxn modelId="{03C82376-6DFF-4B7E-B036-A886B0520F93}" type="presOf" srcId="{DBD17336-B141-494E-A31C-6EA653EE637A}" destId="{62F66354-603A-41C3-B161-16A4A9E45F44}" srcOrd="0" destOrd="0" presId="urn:microsoft.com/office/officeart/2005/8/layout/hProcess9"/>
+    <dgm:cxn modelId="{4296771F-3E76-4B6E-BCA1-FFBE218B6B73}" type="presOf" srcId="{10E407B9-5FCC-4D3A-94D2-6AB25397AEC7}" destId="{8C0195AE-96DF-44DB-8CA5-EA3E73389D9C}" srcOrd="0" destOrd="1" presId="urn:microsoft.com/office/officeart/2005/8/layout/hProcess9"/>
     <dgm:cxn modelId="{6595E131-DCFC-4660-A166-B06A9C58E5A3}" srcId="{182E85C3-C0C1-4055-B42E-08657C1D36EB}" destId="{124AB731-44F7-42FC-A2C7-6A103755875A}" srcOrd="3" destOrd="0" parTransId="{903CC23E-A10B-484A-8A4F-24054DDF4137}" sibTransId="{C0BE0EF1-E06D-43E6-AF12-3CA2033E2AE2}"/>
-    <dgm:cxn modelId="{63AA4ECF-F510-4F05-A169-468A7E8A96E5}" type="presOf" srcId="{6043B0A8-44FC-4706-B37A-7F342ABD7CAE}" destId="{F3C847B4-E9D1-403C-BF56-3BADCB1909DC}" srcOrd="0" destOrd="0" presId="urn:microsoft.com/office/officeart/2005/8/layout/hProcess9"/>
-    <dgm:cxn modelId="{5647984F-2F20-4C53-AFA6-A50F0B2D982A}" srcId="{42A7AF39-9F16-4BE0-9691-F2A4EAA889D5}" destId="{5245D8E1-9FDE-4633-85B7-BE42CD6AA787}" srcOrd="4" destOrd="0" parTransId="{55F15053-25F4-4161-BCA1-92DDB4FB32E9}" sibTransId="{B0D58DB8-A061-4E28-A244-8F898564CBF4}"/>
-    <dgm:cxn modelId="{21C40A1C-D218-4855-8389-19E2BFED7B78}" type="presOf" srcId="{ABD30D39-23EC-4FCC-9B13-57D32A82A546}" destId="{F3C847B4-E9D1-403C-BF56-3BADCB1909DC}" srcOrd="0" destOrd="1" presId="urn:microsoft.com/office/officeart/2005/8/layout/hProcess9"/>
-    <dgm:cxn modelId="{EFB2B553-798E-499E-868E-5A323D49D87B}" type="presOf" srcId="{8852547F-3DE1-4303-BABC-35751A1FFAA4}" destId="{62F66354-603A-41C3-B161-16A4A9E45F44}" srcOrd="0" destOrd="2" presId="urn:microsoft.com/office/officeart/2005/8/layout/hProcess9"/>
-    <dgm:cxn modelId="{5DFF5E92-6524-4E83-9A7E-3FD2AE1E0B19}" srcId="{42A7AF39-9F16-4BE0-9691-F2A4EAA889D5}" destId="{B4BBFA07-05DD-4CDD-AC39-6342607DC2A1}" srcOrd="0" destOrd="0" parTransId="{4C9357AE-0A8A-4E31-8803-F14E79C0DCAE}" sibTransId="{B652451A-AD6D-4DFA-B925-9D21BB71A0C7}"/>
-    <dgm:cxn modelId="{4AA9AB66-BA44-475B-A8A8-30AD54C4CD1A}" srcId="{6043B0A8-44FC-4706-B37A-7F342ABD7CAE}" destId="{1D2BD1DA-3657-4A8C-9785-D7282AB16A84}" srcOrd="3" destOrd="0" parTransId="{13AD18B7-6C9D-4DA5-8CF7-426D68467982}" sibTransId="{5FB73046-B1E2-46DC-A2CC-49B3DBF79A17}"/>
+    <dgm:cxn modelId="{66704B5C-1B3A-4DE5-B794-CC8167E42596}" type="presOf" srcId="{182E85C3-C0C1-4055-B42E-08657C1D36EB}" destId="{BA4718A9-DFD2-471C-969C-97F876ADC320}" srcOrd="0" destOrd="0" presId="urn:microsoft.com/office/officeart/2005/8/layout/hProcess9"/>
+    <dgm:cxn modelId="{607F61A3-2D5A-4D02-89FC-B7345F88B402}" type="presOf" srcId="{1E975C45-1647-472C-8812-EFF81A215801}" destId="{BA4718A9-DFD2-471C-969C-97F876ADC320}" srcOrd="0" destOrd="5" presId="urn:microsoft.com/office/officeart/2005/8/layout/hProcess9"/>
+    <dgm:cxn modelId="{C36FF4DC-CCD6-47E2-9C05-747BCCD4C37E}" type="presOf" srcId="{2739C324-A41E-4970-8A01-796A2C795ACC}" destId="{BA4718A9-DFD2-471C-969C-97F876ADC320}" srcOrd="0" destOrd="1" presId="urn:microsoft.com/office/officeart/2005/8/layout/hProcess9"/>
+    <dgm:cxn modelId="{CA27D4C9-7305-47C1-B558-E71A93D8B295}" type="presOf" srcId="{AD34B4C5-1A81-4AC6-A5F9-35CC4DC5D843}" destId="{20382240-D5AC-4B89-8E53-73A8B41769F1}" srcOrd="0" destOrd="1" presId="urn:microsoft.com/office/officeart/2005/8/layout/hProcess9"/>
     <dgm:cxn modelId="{7B8B71DC-DC57-43EA-BE14-CDBA81ACEF98}" type="presOf" srcId="{42A7AF39-9F16-4BE0-9691-F2A4EAA889D5}" destId="{734A29E2-3521-46BA-B5C0-E8A3637FA4B0}" srcOrd="0" destOrd="0" presId="urn:microsoft.com/office/officeart/2005/8/layout/hProcess9"/>
     <dgm:cxn modelId="{A4E4E3C8-7B99-4F7C-A2C4-16D3A3CA62E3}" type="presOf" srcId="{DDBD9E0E-2857-478B-9BFD-EB049F36A6F4}" destId="{BA4718A9-DFD2-471C-969C-97F876ADC320}" srcOrd="0" destOrd="2" presId="urn:microsoft.com/office/officeart/2005/8/layout/hProcess9"/>
-    <dgm:cxn modelId="{1CE0B2E1-B57A-47FF-B7CD-0A610852C41C}" type="presOf" srcId="{60FFB2DA-71E2-4B60-8F03-B97F02814FE8}" destId="{F3C847B4-E9D1-403C-BF56-3BADCB1909DC}" srcOrd="0" destOrd="2" presId="urn:microsoft.com/office/officeart/2005/8/layout/hProcess9"/>
-    <dgm:cxn modelId="{DECDAAFB-95F9-4E08-902E-357CAE6BE867}" srcId="{42A7AF39-9F16-4BE0-9691-F2A4EAA889D5}" destId="{182E85C3-C0C1-4055-B42E-08657C1D36EB}" srcOrd="1" destOrd="0" parTransId="{0A1F7A6C-A332-4BAC-A0D1-C846CF97F4EC}" sibTransId="{53EC14C8-D3F0-4F81-A9BC-0E03B0043A69}"/>
-    <dgm:cxn modelId="{238D6892-0E24-4060-A415-A69BB6AA037E}" type="presOf" srcId="{27323C3F-7D4E-44F5-9FA3-413CFCD7B174}" destId="{8C0195AE-96DF-44DB-8CA5-EA3E73389D9C}" srcOrd="0" destOrd="3" presId="urn:microsoft.com/office/officeart/2005/8/layout/hProcess9"/>
     <dgm:cxn modelId="{503287BE-2194-4F0B-9AA9-12C9B00499EE}" type="presOf" srcId="{5245D8E1-9FDE-4633-85B7-BE42CD6AA787}" destId="{20382240-D5AC-4B89-8E53-73A8B41769F1}" srcOrd="0" destOrd="0" presId="urn:microsoft.com/office/officeart/2005/8/layout/hProcess9"/>
-    <dgm:cxn modelId="{24BACCAC-AE3B-4A99-B678-9387F463D2EF}" srcId="{6043B0A8-44FC-4706-B37A-7F342ABD7CAE}" destId="{60FFB2DA-71E2-4B60-8F03-B97F02814FE8}" srcOrd="1" destOrd="0" parTransId="{F5495816-0C9E-4B5B-A238-F565E58D7803}" sibTransId="{D06C6867-E1BA-43A9-A6CE-AE88C2CD94FD}"/>
-    <dgm:cxn modelId="{CA27D4C9-7305-47C1-B558-E71A93D8B295}" type="presOf" srcId="{AD34B4C5-1A81-4AC6-A5F9-35CC4DC5D843}" destId="{20382240-D5AC-4B89-8E53-73A8B41769F1}" srcOrd="0" destOrd="1" presId="urn:microsoft.com/office/officeart/2005/8/layout/hProcess9"/>
-    <dgm:cxn modelId="{B317833C-6656-437C-8CFB-9E1078BA4F7B}" srcId="{B4BBFA07-05DD-4CDD-AC39-6342607DC2A1}" destId="{BFAD5C6C-3CCC-47DA-B82A-97A0E60E41A5}" srcOrd="1" destOrd="0" parTransId="{2AC788DB-883E-4B3F-8E32-FB8F2C3C80B9}" sibTransId="{0A4F5D0E-4864-4480-8E69-940E5490226B}"/>
-    <dgm:cxn modelId="{DB1CAB31-0E81-4807-9A4F-8B2AC71839A2}" type="presOf" srcId="{1D2BD1DA-3657-4A8C-9785-D7282AB16A84}" destId="{F3C847B4-E9D1-403C-BF56-3BADCB1909DC}" srcOrd="0" destOrd="4" presId="urn:microsoft.com/office/officeart/2005/8/layout/hProcess9"/>
     <dgm:cxn modelId="{3DE7FD94-D5E7-407C-989B-2C1F91B4CE03}" srcId="{B4BBFA07-05DD-4CDD-AC39-6342607DC2A1}" destId="{27323C3F-7D4E-44F5-9FA3-413CFCD7B174}" srcOrd="2" destOrd="0" parTransId="{18FA00AE-387D-4A8D-981A-94EDEBCA8EC2}" sibTransId="{D4734B30-AB73-4712-B278-2895E8608C4E}"/>
-    <dgm:cxn modelId="{3A080199-5708-4D95-BDC6-677CE1E53018}" srcId="{B4BBFA07-05DD-4CDD-AC39-6342607DC2A1}" destId="{360394FA-829F-403E-9AF0-5F6CF96DFD1E}" srcOrd="3" destOrd="0" parTransId="{A75ACD84-8BFD-4E17-B22A-BCE08E0C1060}" sibTransId="{47CD002A-17EB-41C8-A521-C511E59926EB}"/>
-    <dgm:cxn modelId="{03C82376-6DFF-4B7E-B036-A886B0520F93}" type="presOf" srcId="{DBD17336-B141-494E-A31C-6EA653EE637A}" destId="{62F66354-603A-41C3-B161-16A4A9E45F44}" srcOrd="0" destOrd="0" presId="urn:microsoft.com/office/officeart/2005/8/layout/hProcess9"/>
-    <dgm:cxn modelId="{20EFF80B-8D1F-44F0-A98A-47DA2A47CC91}" type="presOf" srcId="{B4BBFA07-05DD-4CDD-AC39-6342607DC2A1}" destId="{8C0195AE-96DF-44DB-8CA5-EA3E73389D9C}" srcOrd="0" destOrd="0" presId="urn:microsoft.com/office/officeart/2005/8/layout/hProcess9"/>
-    <dgm:cxn modelId="{E2E8D555-E2A1-4B5C-B90D-F16299503649}" srcId="{182E85C3-C0C1-4055-B42E-08657C1D36EB}" destId="{DDBD9E0E-2857-478B-9BFD-EB049F36A6F4}" srcOrd="1" destOrd="0" parTransId="{64FDB413-C3BC-4DF0-942B-0162F878BA5B}" sibTransId="{79BD68F6-F4B8-49E3-96CA-A2D68A915F02}"/>
-    <dgm:cxn modelId="{607F61A3-2D5A-4D02-89FC-B7345F88B402}" type="presOf" srcId="{1E975C45-1647-472C-8812-EFF81A215801}" destId="{BA4718A9-DFD2-471C-969C-97F876ADC320}" srcOrd="0" destOrd="5" presId="urn:microsoft.com/office/officeart/2005/8/layout/hProcess9"/>
+    <dgm:cxn modelId="{1ADAA526-6B24-45CB-89D0-518E04A3D93F}" srcId="{182E85C3-C0C1-4055-B42E-08657C1D36EB}" destId="{3F8391EC-2E89-41BC-979F-48D4E21A811C}" srcOrd="2" destOrd="0" parTransId="{E9716149-5B95-4904-8590-6A93EE8C5197}" sibTransId="{BFA852D6-66A0-4365-B195-CB67CFDCDE73}"/>
     <dgm:cxn modelId="{929DDD9F-A144-4496-902C-7A0CEA79C4C8}" srcId="{5245D8E1-9FDE-4633-85B7-BE42CD6AA787}" destId="{8693C395-BAA7-449A-ACDD-FFFEEE0DC862}" srcOrd="1" destOrd="0" parTransId="{0DB5F330-DE96-4670-8EFA-8B7B45CEA34D}" sibTransId="{87BE7E65-1B97-4314-AB36-B212E2476EE6}"/>
-    <dgm:cxn modelId="{C36FF4DC-CCD6-47E2-9C05-747BCCD4C37E}" type="presOf" srcId="{2739C324-A41E-4970-8A01-796A2C795ACC}" destId="{BA4718A9-DFD2-471C-969C-97F876ADC320}" srcOrd="0" destOrd="1" presId="urn:microsoft.com/office/officeart/2005/8/layout/hProcess9"/>
-    <dgm:cxn modelId="{9423DADA-472C-41D9-88AD-46BB03D27D4E}" srcId="{6043B0A8-44FC-4706-B37A-7F342ABD7CAE}" destId="{ABD30D39-23EC-4FCC-9B13-57D32A82A546}" srcOrd="0" destOrd="0" parTransId="{C5A94903-DF8D-4907-A3E8-951CE956DA5D}" sibTransId="{3EF7BC8F-673B-4ADA-9436-138C06DF52D8}"/>
-    <dgm:cxn modelId="{8130EFA1-7C19-4707-918B-EBD61B992DC1}" srcId="{182E85C3-C0C1-4055-B42E-08657C1D36EB}" destId="{2739C324-A41E-4970-8A01-796A2C795ACC}" srcOrd="0" destOrd="0" parTransId="{34EABE2C-343C-4A99-94EF-992C7B2864FB}" sibTransId="{E3CAAA70-690B-43D6-AD4A-610350C2031C}"/>
-    <dgm:cxn modelId="{08E746BB-D95F-4886-82E3-5ED9A83CD38E}" type="presOf" srcId="{FCE05639-9A34-421D-9FD3-79EEF57498D8}" destId="{62F66354-603A-41C3-B161-16A4A9E45F44}" srcOrd="0" destOrd="1" presId="urn:microsoft.com/office/officeart/2005/8/layout/hProcess9"/>
-    <dgm:cxn modelId="{742F0ED1-DC5E-4FDC-BC68-EC649BA19C45}" srcId="{B4BBFA07-05DD-4CDD-AC39-6342607DC2A1}" destId="{10E407B9-5FCC-4D3A-94D2-6AB25397AEC7}" srcOrd="0" destOrd="0" parTransId="{0560221A-0D57-438B-900A-B03E24CCA932}" sibTransId="{40E49337-7DC0-4E0E-B2C1-5C40A2AD0A26}"/>
-    <dgm:cxn modelId="{66704B5C-1B3A-4DE5-B794-CC8167E42596}" type="presOf" srcId="{182E85C3-C0C1-4055-B42E-08657C1D36EB}" destId="{BA4718A9-DFD2-471C-969C-97F876ADC320}" srcOrd="0" destOrd="0" presId="urn:microsoft.com/office/officeart/2005/8/layout/hProcess9"/>
-    <dgm:cxn modelId="{E98B806D-7427-40E5-9217-58A7BBA4F702}" type="presOf" srcId="{BFAD5C6C-3CCC-47DA-B82A-97A0E60E41A5}" destId="{8C0195AE-96DF-44DB-8CA5-EA3E73389D9C}" srcOrd="0" destOrd="2" presId="urn:microsoft.com/office/officeart/2005/8/layout/hProcess9"/>
-    <dgm:cxn modelId="{2198E06B-EBEE-42F2-BF31-52AD13E73BC6}" srcId="{42A7AF39-9F16-4BE0-9691-F2A4EAA889D5}" destId="{DBD17336-B141-494E-A31C-6EA653EE637A}" srcOrd="3" destOrd="0" parTransId="{09A6F55D-0974-44D2-B12D-48E16F3D0029}" sibTransId="{A6141C16-1C65-42F9-8DF0-A27738FE79EE}"/>
-    <dgm:cxn modelId="{58ECD606-DF49-456C-92CC-3FC995338DA5}" srcId="{182E85C3-C0C1-4055-B42E-08657C1D36EB}" destId="{1E975C45-1647-472C-8812-EFF81A215801}" srcOrd="4" destOrd="0" parTransId="{11DCAC3E-4C2C-4945-B245-E7C69099CB34}" sibTransId="{50A0534A-8921-429F-AEBF-0E0D60438255}"/>
-    <dgm:cxn modelId="{9E16A8B2-B87E-4EC6-8F80-A092713ABD93}" type="presOf" srcId="{64A53441-CA35-4183-98A4-98146221F8AE}" destId="{F3C847B4-E9D1-403C-BF56-3BADCB1909DC}" srcOrd="0" destOrd="3" presId="urn:microsoft.com/office/officeart/2005/8/layout/hProcess9"/>
-    <dgm:cxn modelId="{F99FE896-AED4-426E-B77C-0AB5248E0CCE}" srcId="{6043B0A8-44FC-4706-B37A-7F342ABD7CAE}" destId="{64A53441-CA35-4183-98A4-98146221F8AE}" srcOrd="2" destOrd="0" parTransId="{34A59247-41BB-4387-901C-F4B4BA0ABC20}" sibTransId="{0C284384-0EF7-4A62-BF30-04B34F7CD0AC}"/>
-    <dgm:cxn modelId="{D4AF4160-DDE6-4565-8479-2BC7137E4EDA}" type="presOf" srcId="{8693C395-BAA7-449A-ACDD-FFFEEE0DC862}" destId="{20382240-D5AC-4B89-8E53-73A8B41769F1}" srcOrd="0" destOrd="2" presId="urn:microsoft.com/office/officeart/2005/8/layout/hProcess9"/>
-    <dgm:cxn modelId="{549CF814-C607-4921-A024-5CFAC5637540}" srcId="{5245D8E1-9FDE-4633-85B7-BE42CD6AA787}" destId="{AD34B4C5-1A81-4AC6-A5F9-35CC4DC5D843}" srcOrd="0" destOrd="0" parTransId="{FD6F77B6-DA9F-491F-B649-F16E90DA55B0}" sibTransId="{8B95582E-B691-45DD-8D9C-114E0B7A4E01}"/>
-    <dgm:cxn modelId="{C75F7C68-8484-4A91-B6A3-583D73E6BC93}" type="presOf" srcId="{124AB731-44F7-42FC-A2C7-6A103755875A}" destId="{BA4718A9-DFD2-471C-969C-97F876ADC320}" srcOrd="0" destOrd="4" presId="urn:microsoft.com/office/officeart/2005/8/layout/hProcess9"/>
-    <dgm:cxn modelId="{B848308C-6711-4ECC-A275-3BD95A47C3D1}" type="presOf" srcId="{3F8391EC-2E89-41BC-979F-48D4E21A811C}" destId="{BA4718A9-DFD2-471C-969C-97F876ADC320}" srcOrd="0" destOrd="3" presId="urn:microsoft.com/office/officeart/2005/8/layout/hProcess9"/>
-    <dgm:cxn modelId="{165AFAEA-5E3C-4D2F-B24C-8AB5DB51E1D8}" srcId="{DBD17336-B141-494E-A31C-6EA653EE637A}" destId="{8852547F-3DE1-4303-BABC-35751A1FFAA4}" srcOrd="1" destOrd="0" parTransId="{E3280EF4-38C9-4B21-B7E2-305ED52D9188}" sibTransId="{7EF36CEC-CFA4-4D2A-9ADF-9A92FE46FB8F}"/>
-    <dgm:cxn modelId="{3F65C4C7-8DE4-4F28-82C5-0662EBCF8C0E}" srcId="{DBD17336-B141-494E-A31C-6EA653EE637A}" destId="{FCE05639-9A34-421D-9FD3-79EEF57498D8}" srcOrd="0" destOrd="0" parTransId="{F3903BDF-F0ED-4A06-8C1B-A96D8DDD8DDC}" sibTransId="{4F6AA9F8-0B5F-499B-AE30-3D935C570E4E}"/>
-    <dgm:cxn modelId="{1ADAA526-6B24-45CB-89D0-518E04A3D93F}" srcId="{182E85C3-C0C1-4055-B42E-08657C1D36EB}" destId="{3F8391EC-2E89-41BC-979F-48D4E21A811C}" srcOrd="2" destOrd="0" parTransId="{E9716149-5B95-4904-8590-6A93EE8C5197}" sibTransId="{BFA852D6-66A0-4365-B195-CB67CFDCDE73}"/>
-    <dgm:cxn modelId="{4296771F-3E76-4B6E-BCA1-FFBE218B6B73}" type="presOf" srcId="{10E407B9-5FCC-4D3A-94D2-6AB25397AEC7}" destId="{8C0195AE-96DF-44DB-8CA5-EA3E73389D9C}" srcOrd="0" destOrd="1" presId="urn:microsoft.com/office/officeart/2005/8/layout/hProcess9"/>
     <dgm:cxn modelId="{F3801A3C-3E3D-475A-B6DA-AD1066FF5E06}" type="presParOf" srcId="{734A29E2-3521-46BA-B5C0-E8A3637FA4B0}" destId="{3E058364-C437-4B0E-B373-8D6523686A02}" srcOrd="0" destOrd="0" presId="urn:microsoft.com/office/officeart/2005/8/layout/hProcess9"/>
     <dgm:cxn modelId="{9DDFD9AB-E4CB-4CFE-8C0A-EF116411C6C7}" type="presParOf" srcId="{734A29E2-3521-46BA-B5C0-E8A3637FA4B0}" destId="{90CFEA40-A29F-40A9-966B-DA7D8D7003DF}" srcOrd="1" destOrd="0" presId="urn:microsoft.com/office/officeart/2005/8/layout/hProcess9"/>
     <dgm:cxn modelId="{3BCAA9FB-5D8C-45AB-AAF9-5A4E6A40DDB1}" type="presParOf" srcId="{90CFEA40-A29F-40A9-966B-DA7D8D7003DF}" destId="{8C0195AE-96DF-44DB-8CA5-EA3E73389D9C}" srcOrd="0" destOrd="0" presId="urn:microsoft.com/office/officeart/2005/8/layout/hProcess9"/>
@@ -1992,14 +2002,14 @@
   <dgm:whole/>
   <dgm:extLst>
     <a:ext uri="http://schemas.microsoft.com/office/drawing/2008/diagram">
-      <dsp:dataModelExt xmlns:dsp="http://schemas.microsoft.com/office/drawing/2008/diagram" xmlns="" relId="rId7" minVer="http://schemas.openxmlformats.org/drawingml/2006/diagram"/>
+      <dsp:dataModelExt xmlns:dsp="http://schemas.microsoft.com/office/drawing/2008/diagram" relId="rId7" minVer="http://schemas.openxmlformats.org/drawingml/2006/diagram"/>
     </a:ext>
   </dgm:extLst>
 </dgm:dataModel>
 </file>
 
 <file path=ppt/diagrams/drawing1.xml><?xml version="1.0" encoding="utf-8"?>
-<dsp:drawing xmlns:dgm="http://schemas.openxmlformats.org/drawingml/2006/diagram" xmlns:a="http://schemas.openxmlformats.org/drawingml/2006/main" xmlns:dsp="http://schemas.microsoft.com/office/drawing/2008/diagram">
+<dsp:drawing xmlns:dgm="http://schemas.openxmlformats.org/drawingml/2006/diagram" xmlns:dsp="http://schemas.microsoft.com/office/drawing/2008/diagram" xmlns:a="http://schemas.openxmlformats.org/drawingml/2006/main">
   <dsp:spTree>
     <dsp:nvGrpSpPr>
       <dsp:cNvPr id="0" name=""/>
@@ -2231,8 +2241,8 @@
         </a:p>
       </dsp:txBody>
       <dsp:txXfrm>
-        <a:off x="2601" y="1538503"/>
-        <a:ext cx="1566254" cy="2051337"/>
+        <a:off x="79059" y="1614961"/>
+        <a:ext cx="1413338" cy="1898421"/>
       </dsp:txXfrm>
     </dsp:sp>
     <dsp:sp modelId="{BA4718A9-DFD2-471C-969C-97F876ADC320}">
@@ -2429,8 +2439,8 @@
         </a:p>
       </dsp:txBody>
       <dsp:txXfrm>
-        <a:off x="1829899" y="1538503"/>
-        <a:ext cx="1566254" cy="2051337"/>
+        <a:off x="1906357" y="1614961"/>
+        <a:ext cx="1413338" cy="1898421"/>
       </dsp:txXfrm>
     </dsp:sp>
     <dsp:sp modelId="{F3C847B4-E9D1-403C-BF56-3BADCB1909DC}">
@@ -2612,8 +2622,8 @@
         </a:p>
       </dsp:txBody>
       <dsp:txXfrm>
-        <a:off x="3657196" y="1538503"/>
-        <a:ext cx="1566254" cy="2051337"/>
+        <a:off x="3733654" y="1614961"/>
+        <a:ext cx="1413338" cy="1898421"/>
       </dsp:txXfrm>
     </dsp:sp>
     <dsp:sp modelId="{62F66354-603A-41C3-B161-16A4A9E45F44}">
@@ -2753,8 +2763,8 @@
         </a:p>
       </dsp:txBody>
       <dsp:txXfrm>
-        <a:off x="5484493" y="1538503"/>
-        <a:ext cx="1566254" cy="2051337"/>
+        <a:off x="5560951" y="1614961"/>
+        <a:ext cx="1413338" cy="1898421"/>
       </dsp:txXfrm>
     </dsp:sp>
     <dsp:sp modelId="{20382240-D5AC-4B89-8E53-73A8B41769F1}">
@@ -2894,8 +2904,8 @@
         </a:p>
       </dsp:txBody>
       <dsp:txXfrm>
-        <a:off x="7311791" y="1538503"/>
-        <a:ext cx="1566254" cy="2051337"/>
+        <a:off x="7388249" y="1614961"/>
+        <a:ext cx="1413338" cy="1898421"/>
       </dsp:txXfrm>
     </dsp:sp>
   </dsp:spTree>
@@ -4173,7 +4183,7 @@
             <a:fld id="{6DE7D471-23B3-46CB-9C19-FE802EC31550}" type="datetimeFigureOut">
               <a:rPr lang="de-DE" smtClean="0"/>
               <a:pPr/>
-              <a:t>29.10.2013</a:t>
+              <a:t>30.10.2013</a:t>
             </a:fld>
             <a:endParaRPr lang="de-DE"/>
           </a:p>
@@ -4249,7 +4259,7 @@
     </p:spTree>
     <p:extLst>
       <p:ext uri="{BB962C8B-B14F-4D97-AF65-F5344CB8AC3E}">
-        <p14:creationId xmlns:p14="http://schemas.microsoft.com/office/powerpoint/2010/main" xmlns="" val="4293457334"/>
+        <p14:creationId xmlns:p14="http://schemas.microsoft.com/office/powerpoint/2010/main" val="4293457334"/>
       </p:ext>
     </p:extLst>
   </p:cSld>
@@ -4340,7 +4350,7 @@
             <a:fld id="{F8ADFA6A-A181-4216-B4EE-F250058645E3}" type="datetimeFigureOut">
               <a:rPr lang="de-DE" smtClean="0"/>
               <a:pPr/>
-              <a:t>29.10.2013</a:t>
+              <a:t>30.10.2013</a:t>
             </a:fld>
             <a:endParaRPr lang="de-DE"/>
           </a:p>
@@ -4509,7 +4519,7 @@
     </p:spTree>
     <p:extLst>
       <p:ext uri="{BB962C8B-B14F-4D97-AF65-F5344CB8AC3E}">
-        <p14:creationId xmlns:p14="http://schemas.microsoft.com/office/powerpoint/2010/main" xmlns="" val="2981845176"/>
+        <p14:creationId xmlns:p14="http://schemas.microsoft.com/office/powerpoint/2010/main" val="2981845176"/>
       </p:ext>
     </p:extLst>
   </p:cSld>
@@ -4688,7 +4698,7 @@
     </p:spTree>
     <p:extLst>
       <p:ext uri="{BB962C8B-B14F-4D97-AF65-F5344CB8AC3E}">
-        <p14:creationId xmlns:p14="http://schemas.microsoft.com/office/powerpoint/2010/main" xmlns="" val="3072081027"/>
+        <p14:creationId xmlns:p14="http://schemas.microsoft.com/office/powerpoint/2010/main" val="3072081027"/>
       </p:ext>
     </p:extLst>
   </p:cSld>
@@ -4777,7 +4787,7 @@
     </p:spTree>
     <p:extLst>
       <p:ext uri="{BB962C8B-B14F-4D97-AF65-F5344CB8AC3E}">
-        <p14:creationId xmlns:p14="http://schemas.microsoft.com/office/powerpoint/2010/main" xmlns="" val="471274584"/>
+        <p14:creationId xmlns:p14="http://schemas.microsoft.com/office/powerpoint/2010/main" val="471274584"/>
       </p:ext>
     </p:extLst>
   </p:cSld>
@@ -4866,7 +4876,7 @@
     </p:spTree>
     <p:extLst>
       <p:ext uri="{BB962C8B-B14F-4D97-AF65-F5344CB8AC3E}">
-        <p14:creationId xmlns:p14="http://schemas.microsoft.com/office/powerpoint/2010/main" xmlns="" val="3859340865"/>
+        <p14:creationId xmlns:p14="http://schemas.microsoft.com/office/powerpoint/2010/main" val="3859340865"/>
       </p:ext>
     </p:extLst>
   </p:cSld>
@@ -4955,7 +4965,7 @@
     </p:spTree>
     <p:extLst>
       <p:ext uri="{BB962C8B-B14F-4D97-AF65-F5344CB8AC3E}">
-        <p14:creationId xmlns:p14="http://schemas.microsoft.com/office/powerpoint/2010/main" xmlns="" val="3859340865"/>
+        <p14:creationId xmlns:p14="http://schemas.microsoft.com/office/powerpoint/2010/main" val="3859340865"/>
       </p:ext>
     </p:extLst>
   </p:cSld>
@@ -5044,7 +5054,7 @@
     </p:spTree>
     <p:extLst>
       <p:ext uri="{BB962C8B-B14F-4D97-AF65-F5344CB8AC3E}">
-        <p14:creationId xmlns:p14="http://schemas.microsoft.com/office/powerpoint/2010/main" xmlns="" val="2310265331"/>
+        <p14:creationId xmlns:p14="http://schemas.microsoft.com/office/powerpoint/2010/main" val="2310265331"/>
       </p:ext>
     </p:extLst>
   </p:cSld>
@@ -5133,7 +5143,7 @@
     </p:spTree>
     <p:extLst>
       <p:ext uri="{BB962C8B-B14F-4D97-AF65-F5344CB8AC3E}">
-        <p14:creationId xmlns:p14="http://schemas.microsoft.com/office/powerpoint/2010/main" xmlns="" val="199634551"/>
+        <p14:creationId xmlns:p14="http://schemas.microsoft.com/office/powerpoint/2010/main" val="199634551"/>
       </p:ext>
     </p:extLst>
   </p:cSld>
@@ -5226,7 +5236,7 @@
     </p:spTree>
     <p:extLst>
       <p:ext uri="{BB962C8B-B14F-4D97-AF65-F5344CB8AC3E}">
-        <p14:creationId xmlns:p14="http://schemas.microsoft.com/office/powerpoint/2010/main" xmlns="" val="1602375425"/>
+        <p14:creationId xmlns:p14="http://schemas.microsoft.com/office/powerpoint/2010/main" val="1602375425"/>
       </p:ext>
     </p:extLst>
   </p:cSld>
@@ -5311,7 +5321,7 @@
     </p:spTree>
     <p:extLst>
       <p:ext uri="{BB962C8B-B14F-4D97-AF65-F5344CB8AC3E}">
-        <p14:creationId xmlns:p14="http://schemas.microsoft.com/office/powerpoint/2010/main" xmlns="" val="1794501352"/>
+        <p14:creationId xmlns:p14="http://schemas.microsoft.com/office/powerpoint/2010/main" val="1794501352"/>
       </p:ext>
     </p:extLst>
   </p:cSld>
@@ -5396,7 +5406,7 @@
     </p:spTree>
     <p:extLst>
       <p:ext uri="{BB962C8B-B14F-4D97-AF65-F5344CB8AC3E}">
-        <p14:creationId xmlns:p14="http://schemas.microsoft.com/office/powerpoint/2010/main" xmlns="" val="337020109"/>
+        <p14:creationId xmlns:p14="http://schemas.microsoft.com/office/powerpoint/2010/main" val="337020109"/>
       </p:ext>
     </p:extLst>
   </p:cSld>
@@ -5481,7 +5491,7 @@
     </p:spTree>
     <p:extLst>
       <p:ext uri="{BB962C8B-B14F-4D97-AF65-F5344CB8AC3E}">
-        <p14:creationId xmlns:p14="http://schemas.microsoft.com/office/powerpoint/2010/main" xmlns="" val="2781132002"/>
+        <p14:creationId xmlns:p14="http://schemas.microsoft.com/office/powerpoint/2010/main" val="2781132002"/>
       </p:ext>
     </p:extLst>
   </p:cSld>
@@ -5570,7 +5580,7 @@
     </p:spTree>
     <p:extLst>
       <p:ext uri="{BB962C8B-B14F-4D97-AF65-F5344CB8AC3E}">
-        <p14:creationId xmlns:p14="http://schemas.microsoft.com/office/powerpoint/2010/main" xmlns="" val="2997718527"/>
+        <p14:creationId xmlns:p14="http://schemas.microsoft.com/office/powerpoint/2010/main" val="2997718527"/>
       </p:ext>
     </p:extLst>
   </p:cSld>
@@ -5659,7 +5669,7 @@
     </p:spTree>
     <p:extLst>
       <p:ext uri="{BB962C8B-B14F-4D97-AF65-F5344CB8AC3E}">
-        <p14:creationId xmlns:p14="http://schemas.microsoft.com/office/powerpoint/2010/main" xmlns="" val="358048833"/>
+        <p14:creationId xmlns:p14="http://schemas.microsoft.com/office/powerpoint/2010/main" val="358048833"/>
       </p:ext>
     </p:extLst>
   </p:cSld>
@@ -5777,7 +5787,7 @@
     </p:spTree>
     <p:extLst>
       <p:ext uri="{BB962C8B-B14F-4D97-AF65-F5344CB8AC3E}">
-        <p14:creationId xmlns:p14="http://schemas.microsoft.com/office/powerpoint/2010/main" xmlns="" val="2505227762"/>
+        <p14:creationId xmlns:p14="http://schemas.microsoft.com/office/powerpoint/2010/main" val="2505227762"/>
       </p:ext>
     </p:extLst>
   </p:cSld>
@@ -5866,7 +5876,7 @@
     </p:spTree>
     <p:extLst>
       <p:ext uri="{BB962C8B-B14F-4D97-AF65-F5344CB8AC3E}">
-        <p14:creationId xmlns:p14="http://schemas.microsoft.com/office/powerpoint/2010/main" xmlns="" val="1113625367"/>
+        <p14:creationId xmlns:p14="http://schemas.microsoft.com/office/powerpoint/2010/main" val="1113625367"/>
       </p:ext>
     </p:extLst>
   </p:cSld>
@@ -5955,7 +5965,7 @@
     </p:spTree>
     <p:extLst>
       <p:ext uri="{BB962C8B-B14F-4D97-AF65-F5344CB8AC3E}">
-        <p14:creationId xmlns:p14="http://schemas.microsoft.com/office/powerpoint/2010/main" xmlns="" val="3699469937"/>
+        <p14:creationId xmlns:p14="http://schemas.microsoft.com/office/powerpoint/2010/main" val="3699469937"/>
       </p:ext>
     </p:extLst>
   </p:cSld>
@@ -6044,7 +6054,7 @@
     </p:spTree>
     <p:extLst>
       <p:ext uri="{BB962C8B-B14F-4D97-AF65-F5344CB8AC3E}">
-        <p14:creationId xmlns:p14="http://schemas.microsoft.com/office/powerpoint/2010/main" xmlns="" val="567656433"/>
+        <p14:creationId xmlns:p14="http://schemas.microsoft.com/office/powerpoint/2010/main" val="567656433"/>
       </p:ext>
     </p:extLst>
   </p:cSld>
@@ -6133,7 +6143,7 @@
     </p:spTree>
     <p:extLst>
       <p:ext uri="{BB962C8B-B14F-4D97-AF65-F5344CB8AC3E}">
-        <p14:creationId xmlns:p14="http://schemas.microsoft.com/office/powerpoint/2010/main" xmlns="" val="2657475957"/>
+        <p14:creationId xmlns:p14="http://schemas.microsoft.com/office/powerpoint/2010/main" val="2657475957"/>
       </p:ext>
     </p:extLst>
   </p:cSld>
@@ -6222,7 +6232,7 @@
     </p:spTree>
     <p:extLst>
       <p:ext uri="{BB962C8B-B14F-4D97-AF65-F5344CB8AC3E}">
-        <p14:creationId xmlns:p14="http://schemas.microsoft.com/office/powerpoint/2010/main" xmlns="" val="1770973867"/>
+        <p14:creationId xmlns:p14="http://schemas.microsoft.com/office/powerpoint/2010/main" val="1770973867"/>
       </p:ext>
     </p:extLst>
   </p:cSld>
@@ -6891,7 +6901,7 @@
             <a:fld id="{1E56328B-ED09-4676-B786-CF53801099A1}" type="datetime1">
               <a:rPr lang="de-DE" smtClean="0"/>
               <a:pPr/>
-              <a:t>29.10.2013</a:t>
+              <a:t>30.10.2013</a:t>
             </a:fld>
             <a:endParaRPr lang="de-DE" dirty="0"/>
           </a:p>
@@ -7076,7 +7086,7 @@
             <a:fld id="{8E0C9791-43FD-4BFB-8DD5-A7ADC4663670}" type="datetime1">
               <a:rPr lang="de-DE" smtClean="0"/>
               <a:pPr/>
-              <a:t>29.10.2013</a:t>
+              <a:t>30.10.2013</a:t>
             </a:fld>
             <a:endParaRPr lang="de-DE" dirty="0"/>
           </a:p>
@@ -7253,7 +7263,7 @@
             <a:fld id="{D9140D59-A15F-46C3-B91A-759061DBCFDC}" type="datetime1">
               <a:rPr lang="de-DE" smtClean="0"/>
               <a:pPr/>
-              <a:t>29.10.2013</a:t>
+              <a:t>30.10.2013</a:t>
             </a:fld>
             <a:endParaRPr lang="de-DE" dirty="0"/>
           </a:p>
@@ -7420,7 +7430,7 @@
             <a:fld id="{700792C1-6CE2-4121-AA39-F623E26ABF84}" type="datetime1">
               <a:rPr lang="de-DE" smtClean="0"/>
               <a:pPr/>
-              <a:t>29.10.2013</a:t>
+              <a:t>30.10.2013</a:t>
             </a:fld>
             <a:endParaRPr lang="de-DE" dirty="0"/>
           </a:p>
@@ -7650,7 +7660,7 @@
             <a:fld id="{CA0928A8-61C4-4048-8746-E91EC13E0C8A}" type="datetime1">
               <a:rPr lang="de-DE" smtClean="0"/>
               <a:pPr/>
-              <a:t>29.10.2013</a:t>
+              <a:t>30.10.2013</a:t>
             </a:fld>
             <a:endParaRPr lang="de-DE" dirty="0"/>
           </a:p>
@@ -7911,7 +7921,7 @@
             <a:fld id="{978CFA25-F4CF-40DF-92A3-E9568B1EF53D}" type="datetime1">
               <a:rPr lang="de-DE" smtClean="0"/>
               <a:pPr/>
-              <a:t>29.10.2013</a:t>
+              <a:t>30.10.2013</a:t>
             </a:fld>
             <a:endParaRPr lang="de-DE" dirty="0"/>
           </a:p>
@@ -8317,7 +8327,7 @@
             <a:fld id="{808EAF96-91D5-4DDB-AE91-F35C5F3E4B8B}" type="datetime1">
               <a:rPr lang="de-DE" smtClean="0"/>
               <a:pPr/>
-              <a:t>29.10.2013</a:t>
+              <a:t>30.10.2013</a:t>
             </a:fld>
             <a:endParaRPr lang="de-DE" dirty="0"/>
           </a:p>
@@ -8450,7 +8460,7 @@
             <a:fld id="{DC9DE7D3-3BB2-4519-B05E-95AAEE28A7BA}" type="datetime1">
               <a:rPr lang="de-DE" smtClean="0"/>
               <a:pPr/>
-              <a:t>29.10.2013</a:t>
+              <a:t>30.10.2013</a:t>
             </a:fld>
             <a:endParaRPr lang="de-DE" dirty="0"/>
           </a:p>
@@ -8552,7 +8562,7 @@
             <a:fld id="{5CD1B192-B802-490C-A92D-37CB1628E835}" type="datetime1">
               <a:rPr lang="de-DE" smtClean="0"/>
               <a:pPr/>
-              <a:t>29.10.2013</a:t>
+              <a:t>30.10.2013</a:t>
             </a:fld>
             <a:endParaRPr lang="de-DE" dirty="0"/>
           </a:p>
@@ -8799,7 +8809,7 @@
             <a:fld id="{5B8F4F46-62F6-498A-9857-6CF8E80166B9}" type="datetime1">
               <a:rPr lang="de-DE" smtClean="0"/>
               <a:pPr/>
-              <a:t>29.10.2013</a:t>
+              <a:t>30.10.2013</a:t>
             </a:fld>
             <a:endParaRPr lang="de-DE" dirty="0"/>
           </a:p>
@@ -9045,7 +9055,7 @@
             <a:fld id="{C1CD9BCD-9363-467C-BDE2-666EEFFDF066}" type="datetime1">
               <a:rPr lang="de-DE" smtClean="0"/>
               <a:pPr/>
-              <a:t>29.10.2013</a:t>
+              <a:t>30.10.2013</a:t>
             </a:fld>
             <a:endParaRPr lang="de-DE" dirty="0"/>
           </a:p>
@@ -9871,7 +9881,7 @@
             <a:fld id="{70564968-885B-4558-9753-8E7E1348B15B}" type="datetime1">
               <a:rPr lang="de-DE" smtClean="0"/>
               <a:pPr/>
-              <a:t>29.10.2013</a:t>
+              <a:t>30.10.2013</a:t>
             </a:fld>
             <a:endParaRPr lang="de-DE" dirty="0"/>
           </a:p>
@@ -10329,7 +10339,7 @@
           <a:blip r:embed="rId3" cstate="print">
             <a:extLst>
               <a:ext uri="{28A0092B-C50C-407E-A947-70E740481C1C}">
-                <a14:useLocalDpi xmlns:a14="http://schemas.microsoft.com/office/drawing/2010/main" xmlns="" val="0"/>
+                <a14:useLocalDpi xmlns:a14="http://schemas.microsoft.com/office/drawing/2010/main" val="0"/>
               </a:ext>
             </a:extLst>
           </a:blip>
@@ -10374,7 +10384,7 @@
     </p:spTree>
     <p:extLst>
       <p:ext uri="{BB962C8B-B14F-4D97-AF65-F5344CB8AC3E}">
-        <p14:creationId xmlns:p14="http://schemas.microsoft.com/office/powerpoint/2010/main" xmlns="" val="709012416"/>
+        <p14:creationId xmlns:p14="http://schemas.microsoft.com/office/powerpoint/2010/main" val="709012416"/>
       </p:ext>
     </p:extLst>
   </p:cSld>
@@ -10418,7 +10428,12 @@
             <p:ph type="title"/>
           </p:nvPr>
         </p:nvSpPr>
-        <p:spPr/>
+        <p:spPr>
+          <a:xfrm>
+            <a:off x="457200" y="852768"/>
+            <a:ext cx="8229600" cy="1069848"/>
+          </a:xfrm>
+        </p:spPr>
         <p:txBody>
           <a:bodyPr/>
           <a:lstStyle/>
@@ -10631,8 +10646,8 @@
         </p:nvSpPr>
         <p:spPr>
           <a:xfrm>
-            <a:off x="609600" y="2401824"/>
-            <a:ext cx="8229600" cy="4325112"/>
+            <a:off x="173462" y="2060848"/>
+            <a:ext cx="3852296" cy="4325112"/>
           </a:xfrm>
           <a:prstGeom prst="rect">
             <a:avLst/>
@@ -10816,7 +10831,11 @@
             <a:pPr lvl="1"/>
             <a:r>
               <a:rPr lang="de-DE" dirty="0" smtClean="0"/>
-              <a:t>Keine Redundanzen</a:t>
+              <a:t>Keine </a:t>
+            </a:r>
+            <a:r>
+              <a:rPr lang="de-DE" dirty="0" smtClean="0"/>
+              <a:t>Redundanzen</a:t>
             </a:r>
           </a:p>
           <a:p>
@@ -10830,19 +10849,26 @@
           <a:p>
             <a:r>
               <a:rPr lang="de-DE" dirty="0" smtClean="0"/>
-              <a:t>Schnittstelle zur Datenbank</a:t>
-            </a:r>
-          </a:p>
-          <a:p>
+              <a:t>Schnittstelle zur </a:t>
+            </a:r>
+            <a:r>
+              <a:rPr lang="de-DE" dirty="0" smtClean="0"/>
+              <a:t>Datenbank</a:t>
+            </a:r>
+          </a:p>
+          <a:p>
+            <a:r>
+              <a:rPr lang="de-DE" dirty="0" smtClean="0"/>
+              <a:t>Realisierung durch </a:t>
+            </a:r>
             <a:r>
               <a:rPr lang="de-DE" dirty="0" smtClean="0"/>
               <a:t>SQL </a:t>
             </a:r>
             <a:r>
-              <a:rPr lang="de-DE" dirty="0" err="1" smtClean="0"/>
+              <a:rPr lang="de-DE" dirty="0" smtClean="0"/>
               <a:t>Queries</a:t>
             </a:r>
-            <a:endParaRPr lang="de-DE" dirty="0" smtClean="0"/>
           </a:p>
         </p:txBody>
       </p:sp>
@@ -10870,10 +10896,40 @@
           </a:p>
         </p:txBody>
       </p:sp>
+      <p:pic>
+        <p:nvPicPr>
+          <p:cNvPr id="6" name="Grafik 5"/>
+          <p:cNvPicPr>
+            <a:picLocks noChangeAspect="1"/>
+          </p:cNvPicPr>
+          <p:nvPr/>
+        </p:nvPicPr>
+        <p:blipFill>
+          <a:blip r:embed="rId3">
+            <a:extLst>
+              <a:ext uri="{28A0092B-C50C-407E-A947-70E740481C1C}">
+                <a14:useLocalDpi xmlns:a14="http://schemas.microsoft.com/office/drawing/2010/main" val="0"/>
+              </a:ext>
+            </a:extLst>
+          </a:blip>
+          <a:stretch>
+            <a:fillRect/>
+          </a:stretch>
+        </p:blipFill>
+        <p:spPr>
+          <a:xfrm>
+            <a:off x="4173754" y="525960"/>
+            <a:ext cx="4796784" cy="6344813"/>
+          </a:xfrm>
+          <a:prstGeom prst="rect">
+            <a:avLst/>
+          </a:prstGeom>
+        </p:spPr>
+      </p:pic>
     </p:spTree>
     <p:extLst>
       <p:ext uri="{BB962C8B-B14F-4D97-AF65-F5344CB8AC3E}">
-        <p14:creationId xmlns:p14="http://schemas.microsoft.com/office/powerpoint/2010/main" xmlns="" val="2447740237"/>
+        <p14:creationId xmlns:p14="http://schemas.microsoft.com/office/powerpoint/2010/main" val="2447740237"/>
       </p:ext>
     </p:extLst>
   </p:cSld>
@@ -11162,7 +11218,7 @@
           <a:blip r:embed="rId3" cstate="print">
             <a:extLst>
               <a:ext uri="{28A0092B-C50C-407E-A947-70E740481C1C}">
-                <a14:useLocalDpi xmlns:a14="http://schemas.microsoft.com/office/drawing/2010/main" xmlns="" val="0"/>
+                <a14:useLocalDpi xmlns:a14="http://schemas.microsoft.com/office/drawing/2010/main" val="0"/>
               </a:ext>
             </a:extLst>
           </a:blip>
@@ -11186,14 +11242,14 @@
           <a:effectLst/>
           <a:extLst>
             <a:ext uri="{909E8E84-426E-40DD-AFC4-6F175D3DCCD1}">
-              <a14:hiddenFill xmlns:a14="http://schemas.microsoft.com/office/drawing/2010/main" xmlns="">
+              <a14:hiddenFill xmlns:a14="http://schemas.microsoft.com/office/drawing/2010/main">
                 <a:solidFill>
                   <a:schemeClr val="accent1"/>
                 </a:solidFill>
               </a14:hiddenFill>
             </a:ext>
             <a:ext uri="{91240B29-F687-4F45-9708-019B960494DF}">
-              <a14:hiddenLine xmlns:a14="http://schemas.microsoft.com/office/drawing/2010/main" xmlns="" w="9525">
+              <a14:hiddenLine xmlns:a14="http://schemas.microsoft.com/office/drawing/2010/main" w="9525">
                 <a:solidFill>
                   <a:schemeClr val="tx1"/>
                 </a:solidFill>
@@ -11203,7 +11259,7 @@
               </a14:hiddenLine>
             </a:ext>
             <a:ext uri="{AF507438-7753-43E0-B8FC-AC1667EBCBE1}">
-              <a14:hiddenEffects xmlns:a14="http://schemas.microsoft.com/office/drawing/2010/main" xmlns="">
+              <a14:hiddenEffects xmlns:a14="http://schemas.microsoft.com/office/drawing/2010/main">
                 <a:effectLst>
                   <a:outerShdw dist="35921" dir="2700000" algn="ctr" rotWithShape="0">
                     <a:schemeClr val="bg2"/>
@@ -11241,7 +11297,7 @@
     </p:spTree>
     <p:extLst>
       <p:ext uri="{BB962C8B-B14F-4D97-AF65-F5344CB8AC3E}">
-        <p14:creationId xmlns:p14="http://schemas.microsoft.com/office/powerpoint/2010/main" xmlns="" val="3159283490"/>
+        <p14:creationId xmlns:p14="http://schemas.microsoft.com/office/powerpoint/2010/main" val="3159283490"/>
       </p:ext>
     </p:extLst>
   </p:cSld>
@@ -11391,7 +11447,7 @@
           <a:blip r:embed="rId3" cstate="print">
             <a:extLst>
               <a:ext uri="{28A0092B-C50C-407E-A947-70E740481C1C}">
-                <a14:useLocalDpi xmlns:a14="http://schemas.microsoft.com/office/drawing/2010/main" xmlns="" val="0"/>
+                <a14:useLocalDpi xmlns:a14="http://schemas.microsoft.com/office/drawing/2010/main" val="0"/>
               </a:ext>
             </a:extLst>
           </a:blip>
@@ -11415,14 +11471,14 @@
           <a:effectLst/>
           <a:extLst>
             <a:ext uri="{909E8E84-426E-40DD-AFC4-6F175D3DCCD1}">
-              <a14:hiddenFill xmlns:a14="http://schemas.microsoft.com/office/drawing/2010/main" xmlns="">
+              <a14:hiddenFill xmlns:a14="http://schemas.microsoft.com/office/drawing/2010/main">
                 <a:solidFill>
                   <a:schemeClr val="accent1"/>
                 </a:solidFill>
               </a14:hiddenFill>
             </a:ext>
             <a:ext uri="{91240B29-F687-4F45-9708-019B960494DF}">
-              <a14:hiddenLine xmlns:a14="http://schemas.microsoft.com/office/drawing/2010/main" xmlns="" w="9525">
+              <a14:hiddenLine xmlns:a14="http://schemas.microsoft.com/office/drawing/2010/main" w="9525">
                 <a:solidFill>
                   <a:schemeClr val="tx1"/>
                 </a:solidFill>
@@ -11432,7 +11488,7 @@
               </a14:hiddenLine>
             </a:ext>
             <a:ext uri="{AF507438-7753-43E0-B8FC-AC1667EBCBE1}">
-              <a14:hiddenEffects xmlns:a14="http://schemas.microsoft.com/office/drawing/2010/main" xmlns="">
+              <a14:hiddenEffects xmlns:a14="http://schemas.microsoft.com/office/drawing/2010/main">
                 <a:effectLst>
                   <a:outerShdw dist="35921" dir="2700000" algn="ctr" rotWithShape="0">
                     <a:schemeClr val="bg2"/>
@@ -11470,7 +11526,7 @@
     </p:spTree>
     <p:extLst>
       <p:ext uri="{BB962C8B-B14F-4D97-AF65-F5344CB8AC3E}">
-        <p14:creationId xmlns:p14="http://schemas.microsoft.com/office/powerpoint/2010/main" xmlns="" val="795031017"/>
+        <p14:creationId xmlns:p14="http://schemas.microsoft.com/office/powerpoint/2010/main" val="795031017"/>
       </p:ext>
     </p:extLst>
   </p:cSld>
@@ -11584,7 +11640,7 @@
     </p:spTree>
     <p:extLst>
       <p:ext uri="{BB962C8B-B14F-4D97-AF65-F5344CB8AC3E}">
-        <p14:creationId xmlns:p14="http://schemas.microsoft.com/office/powerpoint/2010/main" xmlns="" val="3420678931"/>
+        <p14:creationId xmlns:p14="http://schemas.microsoft.com/office/powerpoint/2010/main" val="3420678931"/>
       </p:ext>
     </p:extLst>
   </p:cSld>
@@ -11668,7 +11724,7 @@
     </p:spTree>
     <p:extLst>
       <p:ext uri="{BB962C8B-B14F-4D97-AF65-F5344CB8AC3E}">
-        <p14:creationId xmlns:p14="http://schemas.microsoft.com/office/powerpoint/2010/main" xmlns="" val="3414407465"/>
+        <p14:creationId xmlns:p14="http://schemas.microsoft.com/office/powerpoint/2010/main" val="3414407465"/>
       </p:ext>
     </p:extLst>
   </p:cSld>
@@ -11783,7 +11839,7 @@
     </p:spTree>
     <p:extLst>
       <p:ext uri="{BB962C8B-B14F-4D97-AF65-F5344CB8AC3E}">
-        <p14:creationId xmlns:p14="http://schemas.microsoft.com/office/powerpoint/2010/main" xmlns="" val="1709195912"/>
+        <p14:creationId xmlns:p14="http://schemas.microsoft.com/office/powerpoint/2010/main" val="1709195912"/>
       </p:ext>
     </p:extLst>
   </p:cSld>
@@ -11902,7 +11958,7 @@
     </p:spTree>
     <p:extLst>
       <p:ext uri="{BB962C8B-B14F-4D97-AF65-F5344CB8AC3E}">
-        <p14:creationId xmlns:p14="http://schemas.microsoft.com/office/powerpoint/2010/main" xmlns="" val="63509948"/>
+        <p14:creationId xmlns:p14="http://schemas.microsoft.com/office/powerpoint/2010/main" val="63509948"/>
       </p:ext>
     </p:extLst>
   </p:cSld>
@@ -11974,7 +12030,7 @@
           <a:blip r:embed="rId2" cstate="print">
             <a:extLst>
               <a:ext uri="{28A0092B-C50C-407E-A947-70E740481C1C}">
-                <a14:useLocalDpi xmlns:a14="http://schemas.microsoft.com/office/drawing/2010/main" xmlns="" val="0"/>
+                <a14:useLocalDpi xmlns:a14="http://schemas.microsoft.com/office/drawing/2010/main" val="0"/>
               </a:ext>
             </a:extLst>
           </a:blip>
@@ -12024,7 +12080,7 @@
     </p:spTree>
     <p:extLst>
       <p:ext uri="{BB962C8B-B14F-4D97-AF65-F5344CB8AC3E}">
-        <p14:creationId xmlns:p14="http://schemas.microsoft.com/office/powerpoint/2010/main" xmlns="" val="526157708"/>
+        <p14:creationId xmlns:p14="http://schemas.microsoft.com/office/powerpoint/2010/main" val="526157708"/>
       </p:ext>
     </p:extLst>
   </p:cSld>
@@ -12139,7 +12195,7 @@
     </p:spTree>
     <p:extLst>
       <p:ext uri="{BB962C8B-B14F-4D97-AF65-F5344CB8AC3E}">
-        <p14:creationId xmlns:p14="http://schemas.microsoft.com/office/powerpoint/2010/main" xmlns="" val="1260923131"/>
+        <p14:creationId xmlns:p14="http://schemas.microsoft.com/office/powerpoint/2010/main" val="1260923131"/>
       </p:ext>
     </p:extLst>
   </p:cSld>
@@ -12224,7 +12280,7 @@
           <a:blip r:embed="rId2" cstate="print">
             <a:extLst>
               <a:ext uri="{28A0092B-C50C-407E-A947-70E740481C1C}">
-                <a14:useLocalDpi xmlns:a14="http://schemas.microsoft.com/office/drawing/2010/main" xmlns="" val="0"/>
+                <a14:useLocalDpi xmlns:a14="http://schemas.microsoft.com/office/drawing/2010/main" val="0"/>
               </a:ext>
             </a:extLst>
           </a:blip>
@@ -12274,7 +12330,7 @@
     </p:spTree>
     <p:extLst>
       <p:ext uri="{BB962C8B-B14F-4D97-AF65-F5344CB8AC3E}">
-        <p14:creationId xmlns:p14="http://schemas.microsoft.com/office/powerpoint/2010/main" xmlns="" val="2480907429"/>
+        <p14:creationId xmlns:p14="http://schemas.microsoft.com/office/powerpoint/2010/main" val="2480907429"/>
       </p:ext>
     </p:extLst>
   </p:cSld>
@@ -12615,7 +12671,7 @@
     </p:spTree>
     <p:extLst>
       <p:ext uri="{BB962C8B-B14F-4D97-AF65-F5344CB8AC3E}">
-        <p14:creationId xmlns:p14="http://schemas.microsoft.com/office/powerpoint/2010/main" xmlns="" val="2653359653"/>
+        <p14:creationId xmlns:p14="http://schemas.microsoft.com/office/powerpoint/2010/main" val="2653359653"/>
       </p:ext>
     </p:extLst>
   </p:cSld>
@@ -12695,7 +12751,7 @@
           <a:blip r:embed="rId2" cstate="print">
             <a:extLst>
               <a:ext uri="{28A0092B-C50C-407E-A947-70E740481C1C}">
-                <a14:useLocalDpi xmlns:a14="http://schemas.microsoft.com/office/drawing/2010/main" xmlns="" val="0"/>
+                <a14:useLocalDpi xmlns:a14="http://schemas.microsoft.com/office/drawing/2010/main" val="0"/>
               </a:ext>
             </a:extLst>
           </a:blip>
@@ -12745,7 +12801,7 @@
     </p:spTree>
     <p:extLst>
       <p:ext uri="{BB962C8B-B14F-4D97-AF65-F5344CB8AC3E}">
-        <p14:creationId xmlns:p14="http://schemas.microsoft.com/office/powerpoint/2010/main" xmlns="" val="2659840383"/>
+        <p14:creationId xmlns:p14="http://schemas.microsoft.com/office/powerpoint/2010/main" val="2659840383"/>
       </p:ext>
     </p:extLst>
   </p:cSld>
@@ -12862,7 +12918,7 @@
     </p:spTree>
     <p:extLst>
       <p:ext uri="{BB962C8B-B14F-4D97-AF65-F5344CB8AC3E}">
-        <p14:creationId xmlns:p14="http://schemas.microsoft.com/office/powerpoint/2010/main" xmlns="" val="2538859933"/>
+        <p14:creationId xmlns:p14="http://schemas.microsoft.com/office/powerpoint/2010/main" val="2538859933"/>
       </p:ext>
     </p:extLst>
   </p:cSld>
@@ -12996,7 +13052,7 @@
     </p:spTree>
     <p:extLst>
       <p:ext uri="{BB962C8B-B14F-4D97-AF65-F5344CB8AC3E}">
-        <p14:creationId xmlns:p14="http://schemas.microsoft.com/office/powerpoint/2010/main" xmlns="" val="3956960791"/>
+        <p14:creationId xmlns:p14="http://schemas.microsoft.com/office/powerpoint/2010/main" val="3956960791"/>
       </p:ext>
     </p:extLst>
   </p:cSld>
@@ -13131,7 +13187,7 @@
     </p:spTree>
     <p:extLst>
       <p:ext uri="{BB962C8B-B14F-4D97-AF65-F5344CB8AC3E}">
-        <p14:creationId xmlns:p14="http://schemas.microsoft.com/office/powerpoint/2010/main" xmlns="" val="2566061532"/>
+        <p14:creationId xmlns:p14="http://schemas.microsoft.com/office/powerpoint/2010/main" val="2566061532"/>
       </p:ext>
     </p:extLst>
   </p:cSld>
@@ -13266,7 +13322,7 @@
     </p:spTree>
     <p:extLst>
       <p:ext uri="{BB962C8B-B14F-4D97-AF65-F5344CB8AC3E}">
-        <p14:creationId xmlns:p14="http://schemas.microsoft.com/office/powerpoint/2010/main" xmlns="" val="2657265906"/>
+        <p14:creationId xmlns:p14="http://schemas.microsoft.com/office/powerpoint/2010/main" val="2657265906"/>
       </p:ext>
     </p:extLst>
   </p:cSld>
@@ -13401,7 +13457,7 @@
     </p:spTree>
     <p:extLst>
       <p:ext uri="{BB962C8B-B14F-4D97-AF65-F5344CB8AC3E}">
-        <p14:creationId xmlns:p14="http://schemas.microsoft.com/office/powerpoint/2010/main" xmlns="" val="1762684078"/>
+        <p14:creationId xmlns:p14="http://schemas.microsoft.com/office/powerpoint/2010/main" val="1762684078"/>
       </p:ext>
     </p:extLst>
   </p:cSld>
@@ -13511,7 +13567,7 @@
     </p:spTree>
     <p:extLst>
       <p:ext uri="{BB962C8B-B14F-4D97-AF65-F5344CB8AC3E}">
-        <p14:creationId xmlns:p14="http://schemas.microsoft.com/office/powerpoint/2010/main" xmlns="" val="3372370494"/>
+        <p14:creationId xmlns:p14="http://schemas.microsoft.com/office/powerpoint/2010/main" val="3372370494"/>
       </p:ext>
     </p:extLst>
   </p:cSld>
@@ -13831,7 +13887,7 @@
     </p:spTree>
     <p:extLst>
       <p:ext uri="{BB962C8B-B14F-4D97-AF65-F5344CB8AC3E}">
-        <p14:creationId xmlns:p14="http://schemas.microsoft.com/office/powerpoint/2010/main" xmlns="" val="3771086656"/>
+        <p14:creationId xmlns:p14="http://schemas.microsoft.com/office/powerpoint/2010/main" val="3771086656"/>
       </p:ext>
     </p:extLst>
   </p:cSld>
@@ -14177,7 +14233,7 @@
     </p:spTree>
     <p:extLst>
       <p:ext uri="{BB962C8B-B14F-4D97-AF65-F5344CB8AC3E}">
-        <p14:creationId xmlns:p14="http://schemas.microsoft.com/office/powerpoint/2010/main" xmlns="" val="3709997242"/>
+        <p14:creationId xmlns:p14="http://schemas.microsoft.com/office/powerpoint/2010/main" val="3709997242"/>
       </p:ext>
     </p:extLst>
   </p:cSld>
@@ -14515,7 +14571,7 @@
     </p:spTree>
     <p:extLst>
       <p:ext uri="{BB962C8B-B14F-4D97-AF65-F5344CB8AC3E}">
-        <p14:creationId xmlns:p14="http://schemas.microsoft.com/office/powerpoint/2010/main" xmlns="" val="813066869"/>
+        <p14:creationId xmlns:p14="http://schemas.microsoft.com/office/powerpoint/2010/main" val="813066869"/>
       </p:ext>
     </p:extLst>
   </p:cSld>
@@ -14642,7 +14698,7 @@
     </p:spTree>
     <p:extLst>
       <p:ext uri="{BB962C8B-B14F-4D97-AF65-F5344CB8AC3E}">
-        <p14:creationId xmlns:p14="http://schemas.microsoft.com/office/powerpoint/2010/main" xmlns="" val="2231903888"/>
+        <p14:creationId xmlns:p14="http://schemas.microsoft.com/office/powerpoint/2010/main" val="2231903888"/>
       </p:ext>
     </p:extLst>
   </p:cSld>
@@ -14979,7 +15035,7 @@
     </p:spTree>
     <p:extLst>
       <p:ext uri="{BB962C8B-B14F-4D97-AF65-F5344CB8AC3E}">
-        <p14:creationId xmlns:p14="http://schemas.microsoft.com/office/powerpoint/2010/main" xmlns="" val="215732145"/>
+        <p14:creationId xmlns:p14="http://schemas.microsoft.com/office/powerpoint/2010/main" val="215732145"/>
       </p:ext>
     </p:extLst>
   </p:cSld>
@@ -15071,7 +15127,7 @@
     </p:spTree>
     <p:extLst>
       <p:ext uri="{BB962C8B-B14F-4D97-AF65-F5344CB8AC3E}">
-        <p14:creationId xmlns:p14="http://schemas.microsoft.com/office/powerpoint/2010/main" xmlns="" val="3080953501"/>
+        <p14:creationId xmlns:p14="http://schemas.microsoft.com/office/powerpoint/2010/main" val="3080953501"/>
       </p:ext>
     </p:extLst>
   </p:cSld>
@@ -15159,7 +15215,7 @@
     </p:spTree>
     <p:extLst>
       <p:ext uri="{BB962C8B-B14F-4D97-AF65-F5344CB8AC3E}">
-        <p14:creationId xmlns:p14="http://schemas.microsoft.com/office/powerpoint/2010/main" xmlns="" val="1555926251"/>
+        <p14:creationId xmlns:p14="http://schemas.microsoft.com/office/powerpoint/2010/main" val="1555926251"/>
       </p:ext>
     </p:extLst>
   </p:cSld>
@@ -15272,7 +15328,7 @@
     </p:spTree>
     <p:extLst>
       <p:ext uri="{BB962C8B-B14F-4D97-AF65-F5344CB8AC3E}">
-        <p14:creationId xmlns:p14="http://schemas.microsoft.com/office/powerpoint/2010/main" xmlns="" val="511365991"/>
+        <p14:creationId xmlns:p14="http://schemas.microsoft.com/office/powerpoint/2010/main" val="511365991"/>
       </p:ext>
     </p:extLst>
   </p:cSld>
@@ -15392,7 +15448,7 @@
     </p:spTree>
     <p:extLst>
       <p:ext uri="{BB962C8B-B14F-4D97-AF65-F5344CB8AC3E}">
-        <p14:creationId xmlns:p14="http://schemas.microsoft.com/office/powerpoint/2010/main" xmlns="" val="2367586276"/>
+        <p14:creationId xmlns:p14="http://schemas.microsoft.com/office/powerpoint/2010/main" val="2367586276"/>
       </p:ext>
     </p:extLst>
   </p:cSld>
@@ -15500,7 +15556,7 @@
     </p:spTree>
     <p:extLst>
       <p:ext uri="{BB962C8B-B14F-4D97-AF65-F5344CB8AC3E}">
-        <p14:creationId xmlns:p14="http://schemas.microsoft.com/office/powerpoint/2010/main" xmlns="" val="167482871"/>
+        <p14:creationId xmlns:p14="http://schemas.microsoft.com/office/powerpoint/2010/main" val="167482871"/>
       </p:ext>
     </p:extLst>
   </p:cSld>
@@ -15613,7 +15669,7 @@
     </p:spTree>
     <p:extLst>
       <p:ext uri="{BB962C8B-B14F-4D97-AF65-F5344CB8AC3E}">
-        <p14:creationId xmlns:p14="http://schemas.microsoft.com/office/powerpoint/2010/main" xmlns="" val="432645280"/>
+        <p14:creationId xmlns:p14="http://schemas.microsoft.com/office/powerpoint/2010/main" val="432645280"/>
       </p:ext>
     </p:extLst>
   </p:cSld>
@@ -15732,7 +15788,7 @@
     </p:spTree>
     <p:extLst>
       <p:ext uri="{BB962C8B-B14F-4D97-AF65-F5344CB8AC3E}">
-        <p14:creationId xmlns:p14="http://schemas.microsoft.com/office/powerpoint/2010/main" xmlns="" val="2011369229"/>
+        <p14:creationId xmlns:p14="http://schemas.microsoft.com/office/powerpoint/2010/main" val="2011369229"/>
       </p:ext>
     </p:extLst>
   </p:cSld>
@@ -15868,7 +15924,7 @@
     </p:spTree>
     <p:extLst>
       <p:ext uri="{BB962C8B-B14F-4D97-AF65-F5344CB8AC3E}">
-        <p14:creationId xmlns:p14="http://schemas.microsoft.com/office/powerpoint/2010/main" xmlns="" val="241156330"/>
+        <p14:creationId xmlns:p14="http://schemas.microsoft.com/office/powerpoint/2010/main" val="241156330"/>
       </p:ext>
     </p:extLst>
   </p:cSld>
@@ -16013,7 +16069,7 @@
     </p:spTree>
     <p:extLst>
       <p:ext uri="{BB962C8B-B14F-4D97-AF65-F5344CB8AC3E}">
-        <p14:creationId xmlns:p14="http://schemas.microsoft.com/office/powerpoint/2010/main" xmlns="" val="1739418431"/>
+        <p14:creationId xmlns:p14="http://schemas.microsoft.com/office/powerpoint/2010/main" val="1739418431"/>
       </p:ext>
     </p:extLst>
   </p:cSld>
@@ -16439,7 +16495,7 @@
     </p:spTree>
     <p:extLst>
       <p:ext uri="{BB962C8B-B14F-4D97-AF65-F5344CB8AC3E}">
-        <p14:creationId xmlns:p14="http://schemas.microsoft.com/office/powerpoint/2010/main" xmlns="" val="2473085626"/>
+        <p14:creationId xmlns:p14="http://schemas.microsoft.com/office/powerpoint/2010/main" val="2473085626"/>
       </p:ext>
     </p:extLst>
   </p:cSld>
@@ -16553,7 +16609,7 @@
     </p:spTree>
     <p:extLst>
       <p:ext uri="{BB962C8B-B14F-4D97-AF65-F5344CB8AC3E}">
-        <p14:creationId xmlns:p14="http://schemas.microsoft.com/office/powerpoint/2010/main" xmlns="" val="2615168494"/>
+        <p14:creationId xmlns:p14="http://schemas.microsoft.com/office/powerpoint/2010/main" val="2615168494"/>
       </p:ext>
     </p:extLst>
   </p:cSld>
@@ -16678,7 +16734,7 @@
     </p:spTree>
     <p:extLst>
       <p:ext uri="{BB962C8B-B14F-4D97-AF65-F5344CB8AC3E}">
-        <p14:creationId xmlns:p14="http://schemas.microsoft.com/office/powerpoint/2010/main" xmlns="" val="42813484"/>
+        <p14:creationId xmlns:p14="http://schemas.microsoft.com/office/powerpoint/2010/main" val="42813484"/>
       </p:ext>
     </p:extLst>
   </p:cSld>
@@ -16805,7 +16861,7 @@
     </p:spTree>
     <p:extLst>
       <p:ext uri="{BB962C8B-B14F-4D97-AF65-F5344CB8AC3E}">
-        <p14:creationId xmlns:p14="http://schemas.microsoft.com/office/powerpoint/2010/main" xmlns="" val="243874718"/>
+        <p14:creationId xmlns:p14="http://schemas.microsoft.com/office/powerpoint/2010/main" val="243874718"/>
       </p:ext>
     </p:extLst>
   </p:cSld>
@@ -16961,7 +17017,7 @@
     </p:spTree>
     <p:extLst>
       <p:ext uri="{BB962C8B-B14F-4D97-AF65-F5344CB8AC3E}">
-        <p14:creationId xmlns:p14="http://schemas.microsoft.com/office/powerpoint/2010/main" xmlns="" val="600913733"/>
+        <p14:creationId xmlns:p14="http://schemas.microsoft.com/office/powerpoint/2010/main" val="600913733"/>
       </p:ext>
     </p:extLst>
   </p:cSld>
@@ -17101,7 +17157,7 @@
     </p:spTree>
     <p:extLst>
       <p:ext uri="{BB962C8B-B14F-4D97-AF65-F5344CB8AC3E}">
-        <p14:creationId xmlns:p14="http://schemas.microsoft.com/office/powerpoint/2010/main" xmlns="" val="3395818784"/>
+        <p14:creationId xmlns:p14="http://schemas.microsoft.com/office/powerpoint/2010/main" val="3395818784"/>
       </p:ext>
     </p:extLst>
   </p:cSld>
@@ -17228,7 +17284,7 @@
     </p:spTree>
     <p:extLst>
       <p:ext uri="{BB962C8B-B14F-4D97-AF65-F5344CB8AC3E}">
-        <p14:creationId xmlns:p14="http://schemas.microsoft.com/office/powerpoint/2010/main" xmlns="" val="1313710794"/>
+        <p14:creationId xmlns:p14="http://schemas.microsoft.com/office/powerpoint/2010/main" val="1313710794"/>
       </p:ext>
     </p:extLst>
   </p:cSld>
@@ -17349,7 +17405,7 @@
     </p:spTree>
     <p:extLst>
       <p:ext uri="{BB962C8B-B14F-4D97-AF65-F5344CB8AC3E}">
-        <p14:creationId xmlns:p14="http://schemas.microsoft.com/office/powerpoint/2010/main" xmlns="" val="2204375755"/>
+        <p14:creationId xmlns:p14="http://schemas.microsoft.com/office/powerpoint/2010/main" val="2204375755"/>
       </p:ext>
     </p:extLst>
   </p:cSld>
@@ -17482,7 +17538,7 @@
     </p:spTree>
     <p:extLst>
       <p:ext uri="{BB962C8B-B14F-4D97-AF65-F5344CB8AC3E}">
-        <p14:creationId xmlns:p14="http://schemas.microsoft.com/office/powerpoint/2010/main" xmlns="" val="2726382500"/>
+        <p14:creationId xmlns:p14="http://schemas.microsoft.com/office/powerpoint/2010/main" val="2726382500"/>
       </p:ext>
     </p:extLst>
   </p:cSld>
@@ -17546,7 +17602,7 @@
           <p:nvPr>
             <p:extLst>
               <p:ext uri="{D42A27DB-BD31-4B8C-83A1-F6EECF244321}">
-                <p14:modId xmlns:p14="http://schemas.microsoft.com/office/powerpoint/2010/main" xmlns="" val="1881831684"/>
+                <p14:modId xmlns:p14="http://schemas.microsoft.com/office/powerpoint/2010/main" val="1881831684"/>
               </p:ext>
             </p:extLst>
           </p:nvPr>
@@ -17588,7 +17644,7 @@
     </p:spTree>
     <p:extLst>
       <p:ext uri="{BB962C8B-B14F-4D97-AF65-F5344CB8AC3E}">
-        <p14:creationId xmlns:p14="http://schemas.microsoft.com/office/powerpoint/2010/main" xmlns="" val="4174946828"/>
+        <p14:creationId xmlns:p14="http://schemas.microsoft.com/office/powerpoint/2010/main" val="4174946828"/>
       </p:ext>
     </p:extLst>
   </p:cSld>
@@ -17670,7 +17726,7 @@
           <a:blip r:embed="rId3" cstate="print">
             <a:extLst>
               <a:ext uri="{28A0092B-C50C-407E-A947-70E740481C1C}">
-                <a14:useLocalDpi xmlns:a14="http://schemas.microsoft.com/office/drawing/2010/main" xmlns="" val="0"/>
+                <a14:useLocalDpi xmlns:a14="http://schemas.microsoft.com/office/drawing/2010/main" val="0"/>
               </a:ext>
             </a:extLst>
           </a:blip>
@@ -17693,14 +17749,14 @@
           </a:ln>
           <a:extLst>
             <a:ext uri="{909E8E84-426E-40DD-AFC4-6F175D3DCCD1}">
-              <a14:hiddenFill xmlns:a14="http://schemas.microsoft.com/office/drawing/2010/main" xmlns="">
+              <a14:hiddenFill xmlns:a14="http://schemas.microsoft.com/office/drawing/2010/main">
                 <a:solidFill>
                   <a:schemeClr val="accent1"/>
                 </a:solidFill>
               </a14:hiddenFill>
             </a:ext>
             <a:ext uri="{91240B29-F687-4F45-9708-019B960494DF}">
-              <a14:hiddenLine xmlns:a14="http://schemas.microsoft.com/office/drawing/2010/main" xmlns="" w="9525">
+              <a14:hiddenLine xmlns:a14="http://schemas.microsoft.com/office/drawing/2010/main" w="9525">
                 <a:solidFill>
                   <a:schemeClr val="tx1"/>
                 </a:solidFill>
@@ -17739,7 +17795,7 @@
     </p:spTree>
     <p:extLst>
       <p:ext uri="{BB962C8B-B14F-4D97-AF65-F5344CB8AC3E}">
-        <p14:creationId xmlns:p14="http://schemas.microsoft.com/office/powerpoint/2010/main" xmlns="" val="1176199176"/>
+        <p14:creationId xmlns:p14="http://schemas.microsoft.com/office/powerpoint/2010/main" val="1176199176"/>
       </p:ext>
     </p:extLst>
   </p:cSld>
@@ -17785,7 +17841,7 @@
           <a:blip r:embed="rId3" cstate="print">
             <a:extLst>
               <a:ext uri="{28A0092B-C50C-407E-A947-70E740481C1C}">
-                <a14:useLocalDpi xmlns:a14="http://schemas.microsoft.com/office/drawing/2010/main" xmlns="" val="0"/>
+                <a14:useLocalDpi xmlns:a14="http://schemas.microsoft.com/office/drawing/2010/main" val="0"/>
               </a:ext>
             </a:extLst>
           </a:blip>
@@ -17876,7 +17932,7 @@
           <a:blip r:embed="rId4" cstate="print">
             <a:extLst>
               <a:ext uri="{28A0092B-C50C-407E-A947-70E740481C1C}">
-                <a14:useLocalDpi xmlns:a14="http://schemas.microsoft.com/office/drawing/2010/main" xmlns="" val="0"/>
+                <a14:useLocalDpi xmlns:a14="http://schemas.microsoft.com/office/drawing/2010/main" val="0"/>
               </a:ext>
             </a:extLst>
           </a:blip>
@@ -17906,7 +17962,7 @@
           <a:blip r:embed="rId5" cstate="print">
             <a:extLst>
               <a:ext uri="{28A0092B-C50C-407E-A947-70E740481C1C}">
-                <a14:useLocalDpi xmlns:a14="http://schemas.microsoft.com/office/drawing/2010/main" xmlns="" val="0"/>
+                <a14:useLocalDpi xmlns:a14="http://schemas.microsoft.com/office/drawing/2010/main" val="0"/>
               </a:ext>
             </a:extLst>
           </a:blip>
@@ -18012,7 +18068,7 @@
           <a:blip r:embed="rId6" cstate="print">
             <a:extLst>
               <a:ext uri="{28A0092B-C50C-407E-A947-70E740481C1C}">
-                <a14:useLocalDpi xmlns:a14="http://schemas.microsoft.com/office/drawing/2010/main" xmlns="" val="0"/>
+                <a14:useLocalDpi xmlns:a14="http://schemas.microsoft.com/office/drawing/2010/main" val="0"/>
               </a:ext>
             </a:extLst>
           </a:blip>
@@ -18213,7 +18269,7 @@
     </p:spTree>
     <p:extLst>
       <p:ext uri="{BB962C8B-B14F-4D97-AF65-F5344CB8AC3E}">
-        <p14:creationId xmlns:p14="http://schemas.microsoft.com/office/powerpoint/2010/main" xmlns="" val="2896085358"/>
+        <p14:creationId xmlns:p14="http://schemas.microsoft.com/office/powerpoint/2010/main" val="2896085358"/>
       </p:ext>
     </p:extLst>
   </p:cSld>
@@ -19173,7 +19229,7 @@
     </p:spTree>
     <p:extLst>
       <p:ext uri="{BB962C8B-B14F-4D97-AF65-F5344CB8AC3E}">
-        <p14:creationId xmlns:p14="http://schemas.microsoft.com/office/powerpoint/2010/main" xmlns="" val="2247188198"/>
+        <p14:creationId xmlns:p14="http://schemas.microsoft.com/office/powerpoint/2010/main" val="2247188198"/>
       </p:ext>
     </p:extLst>
   </p:cSld>
@@ -19695,7 +19751,7 @@
     </p:spTree>
     <p:extLst>
       <p:ext uri="{BB962C8B-B14F-4D97-AF65-F5344CB8AC3E}">
-        <p14:creationId xmlns:p14="http://schemas.microsoft.com/office/powerpoint/2010/main" xmlns="" val="3149715247"/>
+        <p14:creationId xmlns:p14="http://schemas.microsoft.com/office/powerpoint/2010/main" val="3149715247"/>
       </p:ext>
     </p:extLst>
   </p:cSld>

</xml_diff>